<commit_message>
* Add a paragraph explaining {fig:block} * Update figures for larger font size
</commit_message>
<xml_diff>
--- a/contents/review.pptx
+++ b/contents/review.pptx
@@ -5627,6 +5627,9 @@
             </a:pPr>
             <a:r>
               <a:rPr lang="en-US" altLang="ko-KR" sz="1200" dirty="0">
+                <a:solidFill>
+                  <a:schemeClr val="accent6"/>
+                </a:solidFill>
                 <a:latin typeface="NanumBarunGothic" panose="020B0603020101020101" pitchFamily="34" charset="-127"/>
                 <a:ea typeface="NanumBarunGothic" panose="020B0603020101020101" pitchFamily="34" charset="-127"/>
               </a:rPr>
@@ -5958,6 +5961,9 @@
             </a:pPr>
             <a:r>
               <a:rPr lang="en-US" altLang="ko-KR" sz="1200" dirty="0">
+                <a:solidFill>
+                  <a:schemeClr val="accent6"/>
+                </a:solidFill>
                 <a:latin typeface="NanumBarunGothic" panose="020B0603020101020101" pitchFamily="34" charset="-127"/>
                 <a:ea typeface="NanumBarunGothic" panose="020B0603020101020101" pitchFamily="34" charset="-127"/>
               </a:rPr>
@@ -5965,6 +5971,9 @@
             </a:r>
             <a:r>
               <a:rPr lang="ko-KR" altLang="en-US" sz="1200" dirty="0">
+                <a:solidFill>
+                  <a:schemeClr val="accent6"/>
+                </a:solidFill>
                 <a:latin typeface="NanumBarunGothic" panose="020B0603020101020101" pitchFamily="34" charset="-127"/>
                 <a:ea typeface="NanumBarunGothic" panose="020B0603020101020101" pitchFamily="34" charset="-127"/>
               </a:rPr>
@@ -5972,6 +5981,9 @@
             </a:r>
             <a:r>
               <a:rPr lang="en-US" altLang="ko-KR" sz="1200" dirty="0">
+                <a:solidFill>
+                  <a:schemeClr val="accent6"/>
+                </a:solidFill>
                 <a:latin typeface="NanumBarunGothic" panose="020B0603020101020101" pitchFamily="34" charset="-127"/>
                 <a:ea typeface="NanumBarunGothic" panose="020B0603020101020101" pitchFamily="34" charset="-127"/>
               </a:rPr>
@@ -5979,6 +5991,9 @@
             </a:r>
             <a:r>
               <a:rPr lang="ko-KR" altLang="en-US" sz="1200" dirty="0">
+                <a:solidFill>
+                  <a:schemeClr val="accent6"/>
+                </a:solidFill>
                 <a:latin typeface="NanumBarunGothic" panose="020B0603020101020101" pitchFamily="34" charset="-127"/>
                 <a:ea typeface="NanumBarunGothic" panose="020B0603020101020101" pitchFamily="34" charset="-127"/>
               </a:rPr>
@@ -5986,6 +6001,9 @@
             </a:r>
             <a:r>
               <a:rPr lang="en-US" altLang="ko-KR" sz="1200" dirty="0">
+                <a:solidFill>
+                  <a:schemeClr val="accent6"/>
+                </a:solidFill>
                 <a:latin typeface="NanumBarunGothic" panose="020B0603020101020101" pitchFamily="34" charset="-127"/>
                 <a:ea typeface="NanumBarunGothic" panose="020B0603020101020101" pitchFamily="34" charset="-127"/>
               </a:rPr>

</xml_diff>

<commit_message>
* Add some explanation for KPF-BERT, ETRI-ELECTRA, ETRI-RoBERTa
</commit_message>
<xml_diff>
--- a/contents/review.pptx
+++ b/contents/review.pptx
@@ -4578,6 +4578,9 @@
             </a:pPr>
             <a:r>
               <a:rPr lang="en-US" altLang="ko-KR" sz="1200" dirty="0">
+                <a:solidFill>
+                  <a:schemeClr val="accent6"/>
+                </a:solidFill>
                 <a:latin typeface="NanumBarunGothic" panose="020B0603020101020101" pitchFamily="34" charset="-127"/>
                 <a:ea typeface="NanumBarunGothic" panose="020B0603020101020101" pitchFamily="34" charset="-127"/>
               </a:rPr>
@@ -4585,6 +4588,9 @@
             </a:r>
             <a:r>
               <a:rPr lang="en-US" altLang="ko-KR" sz="1200" dirty="0" err="1">
+                <a:solidFill>
+                  <a:schemeClr val="accent6"/>
+                </a:solidFill>
                 <a:latin typeface="NanumBarunGothic" panose="020B0603020101020101" pitchFamily="34" charset="-127"/>
                 <a:ea typeface="NanumBarunGothic" panose="020B0603020101020101" pitchFamily="34" charset="-127"/>
               </a:rPr>
@@ -4592,6 +4598,9 @@
             </a:r>
             <a:r>
               <a:rPr lang="en-US" altLang="ko-KR" sz="1200" dirty="0">
+                <a:solidFill>
+                  <a:schemeClr val="accent6"/>
+                </a:solidFill>
                 <a:latin typeface="NanumBarunGothic" panose="020B0603020101020101" pitchFamily="34" charset="-127"/>
                 <a:ea typeface="NanumBarunGothic" panose="020B0603020101020101" pitchFamily="34" charset="-127"/>
               </a:rPr>
@@ -5220,6 +5229,9 @@
             </a:pPr>
             <a:r>
               <a:rPr lang="en-US" altLang="ko-KR" sz="1200" dirty="0">
+                <a:solidFill>
+                  <a:schemeClr val="accent6"/>
+                </a:solidFill>
                 <a:latin typeface="NanumBarunGothic" panose="020B0603020101020101" pitchFamily="34" charset="-127"/>
                 <a:ea typeface="NanumBarunGothic" panose="020B0603020101020101" pitchFamily="34" charset="-127"/>
               </a:rPr>
@@ -5227,6 +5239,9 @@
             </a:r>
             <a:r>
               <a:rPr lang="ko-KR" altLang="en-US" sz="1200" dirty="0">
+                <a:solidFill>
+                  <a:schemeClr val="accent6"/>
+                </a:solidFill>
                 <a:latin typeface="NanumBarunGothic" panose="020B0603020101020101" pitchFamily="34" charset="-127"/>
                 <a:ea typeface="NanumBarunGothic" panose="020B0603020101020101" pitchFamily="34" charset="-127"/>
               </a:rPr>
@@ -5234,6 +5249,9 @@
             </a:r>
             <a:r>
               <a:rPr lang="en-US" altLang="ko-KR" sz="1200" dirty="0">
+                <a:solidFill>
+                  <a:schemeClr val="accent6"/>
+                </a:solidFill>
                 <a:latin typeface="NanumBarunGothic" panose="020B0603020101020101" pitchFamily="34" charset="-127"/>
                 <a:ea typeface="NanumBarunGothic" panose="020B0603020101020101" pitchFamily="34" charset="-127"/>
               </a:rPr>
@@ -5241,6 +5259,9 @@
             </a:r>
             <a:r>
               <a:rPr lang="en-US" altLang="ko-KR" sz="1200" dirty="0" err="1">
+                <a:solidFill>
+                  <a:schemeClr val="accent6"/>
+                </a:solidFill>
                 <a:latin typeface="NanumBarunGothic" panose="020B0603020101020101" pitchFamily="34" charset="-127"/>
                 <a:ea typeface="NanumBarunGothic" panose="020B0603020101020101" pitchFamily="34" charset="-127"/>
               </a:rPr>
@@ -5248,6 +5269,9 @@
             </a:r>
             <a:r>
               <a:rPr lang="en-US" altLang="ko-KR" sz="1200" dirty="0">
+                <a:solidFill>
+                  <a:schemeClr val="accent6"/>
+                </a:solidFill>
                 <a:latin typeface="NanumBarunGothic" panose="020B0603020101020101" pitchFamily="34" charset="-127"/>
                 <a:ea typeface="NanumBarunGothic" panose="020B0603020101020101" pitchFamily="34" charset="-127"/>
               </a:rPr>
@@ -5255,6 +5279,9 @@
             </a:r>
             <a:r>
               <a:rPr lang="ko-KR" altLang="en-US" sz="1200" dirty="0">
+                <a:solidFill>
+                  <a:schemeClr val="accent6"/>
+                </a:solidFill>
                 <a:latin typeface="NanumBarunGothic" panose="020B0603020101020101" pitchFamily="34" charset="-127"/>
                 <a:ea typeface="NanumBarunGothic" panose="020B0603020101020101" pitchFamily="34" charset="-127"/>
               </a:rPr>
@@ -5262,6 +5289,9 @@
             </a:r>
             <a:r>
               <a:rPr lang="en-US" altLang="ko-KR" sz="1200" dirty="0">
+                <a:solidFill>
+                  <a:schemeClr val="accent6"/>
+                </a:solidFill>
                 <a:latin typeface="NanumBarunGothic" panose="020B0603020101020101" pitchFamily="34" charset="-127"/>
                 <a:ea typeface="NanumBarunGothic" panose="020B0603020101020101" pitchFamily="34" charset="-127"/>
               </a:rPr>

</xml_diff>

<commit_message>
* Define eojeol accuracy and morpheme F1 score
</commit_message>
<xml_diff>
--- a/contents/review.pptx
+++ b/contents/review.pptx
@@ -4616,6 +4616,9 @@
             </a:pPr>
             <a:r>
               <a:rPr lang="en-US" altLang="ko-KR" sz="1200" dirty="0">
+                <a:solidFill>
+                  <a:schemeClr val="accent6"/>
+                </a:solidFill>
                 <a:latin typeface="NanumBarunGothic" panose="020B0603020101020101" pitchFamily="34" charset="-127"/>
                 <a:ea typeface="NanumBarunGothic" panose="020B0603020101020101" pitchFamily="34" charset="-127"/>
               </a:rPr>
@@ -4623,6 +4626,9 @@
             </a:r>
             <a:r>
               <a:rPr lang="en-US" altLang="ko-KR" sz="1200" dirty="0" err="1">
+                <a:solidFill>
+                  <a:schemeClr val="accent6"/>
+                </a:solidFill>
                 <a:latin typeface="NanumBarunGothic" panose="020B0603020101020101" pitchFamily="34" charset="-127"/>
                 <a:ea typeface="NanumBarunGothic" panose="020B0603020101020101" pitchFamily="34" charset="-127"/>
               </a:rPr>
@@ -4630,6 +4636,9 @@
             </a:r>
             <a:r>
               <a:rPr lang="en-US" altLang="ko-KR" sz="1200" dirty="0">
+                <a:solidFill>
+                  <a:schemeClr val="accent6"/>
+                </a:solidFill>
                 <a:latin typeface="NanumBarunGothic" panose="020B0603020101020101" pitchFamily="34" charset="-127"/>
                 <a:ea typeface="NanumBarunGothic" panose="020B0603020101020101" pitchFamily="34" charset="-127"/>
               </a:rPr>
@@ -5307,6 +5316,9 @@
             </a:pPr>
             <a:r>
               <a:rPr lang="en-US" altLang="ko-KR" sz="1200" dirty="0">
+                <a:solidFill>
+                  <a:schemeClr val="accent6"/>
+                </a:solidFill>
                 <a:latin typeface="NanumBarunGothic" panose="020B0603020101020101" pitchFamily="34" charset="-127"/>
                 <a:ea typeface="NanumBarunGothic" panose="020B0603020101020101" pitchFamily="34" charset="-127"/>
               </a:rPr>
@@ -5314,6 +5326,9 @@
             </a:r>
             <a:r>
               <a:rPr lang="ko-KR" altLang="en-US" sz="1200" dirty="0">
+                <a:solidFill>
+                  <a:schemeClr val="accent6"/>
+                </a:solidFill>
                 <a:latin typeface="NanumBarunGothic" panose="020B0603020101020101" pitchFamily="34" charset="-127"/>
                 <a:ea typeface="NanumBarunGothic" panose="020B0603020101020101" pitchFamily="34" charset="-127"/>
               </a:rPr>
@@ -5321,6 +5336,9 @@
             </a:r>
             <a:r>
               <a:rPr lang="en-US" altLang="ko-KR" sz="1200" dirty="0">
+                <a:solidFill>
+                  <a:schemeClr val="accent6"/>
+                </a:solidFill>
                 <a:latin typeface="NanumBarunGothic" panose="020B0603020101020101" pitchFamily="34" charset="-127"/>
                 <a:ea typeface="NanumBarunGothic" panose="020B0603020101020101" pitchFamily="34" charset="-127"/>
               </a:rPr>
@@ -5328,6 +5346,9 @@
             </a:r>
             <a:r>
               <a:rPr lang="ko-KR" altLang="en-US" sz="1200" dirty="0">
+                <a:solidFill>
+                  <a:schemeClr val="accent6"/>
+                </a:solidFill>
                 <a:latin typeface="NanumBarunGothic" panose="020B0603020101020101" pitchFamily="34" charset="-127"/>
                 <a:ea typeface="NanumBarunGothic" panose="020B0603020101020101" pitchFamily="34" charset="-127"/>
               </a:rPr>
@@ -5335,6 +5356,9 @@
             </a:r>
             <a:r>
               <a:rPr lang="en-US" altLang="ko-KR" sz="1200" dirty="0">
+                <a:solidFill>
+                  <a:schemeClr val="accent6"/>
+                </a:solidFill>
                 <a:latin typeface="NanumBarunGothic" panose="020B0603020101020101" pitchFamily="34" charset="-127"/>
                 <a:ea typeface="NanumBarunGothic" panose="020B0603020101020101" pitchFamily="34" charset="-127"/>
               </a:rPr>
@@ -5342,6 +5366,9 @@
             </a:r>
             <a:r>
               <a:rPr lang="ko-KR" altLang="en-US" sz="1200" dirty="0">
+                <a:solidFill>
+                  <a:schemeClr val="accent6"/>
+                </a:solidFill>
                 <a:latin typeface="NanumBarunGothic" panose="020B0603020101020101" pitchFamily="34" charset="-127"/>
                 <a:ea typeface="NanumBarunGothic" panose="020B0603020101020101" pitchFamily="34" charset="-127"/>
               </a:rPr>
@@ -5349,6 +5376,9 @@
             </a:r>
             <a:r>
               <a:rPr lang="en-US" altLang="ko-KR" sz="1200" dirty="0">
+                <a:solidFill>
+                  <a:schemeClr val="accent6"/>
+                </a:solidFill>
                 <a:latin typeface="NanumBarunGothic" panose="020B0603020101020101" pitchFamily="34" charset="-127"/>
                 <a:ea typeface="NanumBarunGothic" panose="020B0603020101020101" pitchFamily="34" charset="-127"/>
               </a:rPr>
@@ -5356,6 +5386,9 @@
             </a:r>
             <a:r>
               <a:rPr lang="ko-KR" altLang="en-US" sz="1200" dirty="0">
+                <a:solidFill>
+                  <a:schemeClr val="accent6"/>
+                </a:solidFill>
                 <a:latin typeface="NanumBarunGothic" panose="020B0603020101020101" pitchFamily="34" charset="-127"/>
                 <a:ea typeface="NanumBarunGothic" panose="020B0603020101020101" pitchFamily="34" charset="-127"/>
               </a:rPr>
@@ -5363,6 +5396,9 @@
             </a:r>
             <a:r>
               <a:rPr lang="en-US" altLang="ko-KR" sz="1200" dirty="0">
+                <a:solidFill>
+                  <a:schemeClr val="accent6"/>
+                </a:solidFill>
                 <a:latin typeface="NanumBarunGothic" panose="020B0603020101020101" pitchFamily="34" charset="-127"/>
                 <a:ea typeface="NanumBarunGothic" panose="020B0603020101020101" pitchFamily="34" charset="-127"/>
               </a:rPr>
@@ -5370,6 +5406,9 @@
             </a:r>
             <a:r>
               <a:rPr lang="ko-KR" altLang="en-US" sz="1200" dirty="0">
+                <a:solidFill>
+                  <a:schemeClr val="accent6"/>
+                </a:solidFill>
                 <a:latin typeface="NanumBarunGothic" panose="020B0603020101020101" pitchFamily="34" charset="-127"/>
                 <a:ea typeface="NanumBarunGothic" panose="020B0603020101020101" pitchFamily="34" charset="-127"/>
               </a:rPr>
@@ -5377,6 +5416,9 @@
             </a:r>
             <a:r>
               <a:rPr lang="en-US" altLang="ko-KR" sz="1200" dirty="0">
+                <a:solidFill>
+                  <a:schemeClr val="accent6"/>
+                </a:solidFill>
                 <a:latin typeface="NanumBarunGothic" panose="020B0603020101020101" pitchFamily="34" charset="-127"/>
                 <a:ea typeface="NanumBarunGothic" panose="020B0603020101020101" pitchFamily="34" charset="-127"/>
               </a:rPr>

</xml_diff>

<commit_message>
Responding to reviewer comments: 4. Deep learning is used but the models are not properly explained with diagrams.
</commit_message>
<xml_diff>
--- a/contents/review.pptx
+++ b/contents/review.pptx
@@ -5765,6 +5765,9 @@
             </a:pPr>
             <a:r>
               <a:rPr lang="en-US" altLang="ko-KR" sz="1200" dirty="0">
+                <a:solidFill>
+                  <a:schemeClr val="accent6"/>
+                </a:solidFill>
                 <a:latin typeface="NanumBarunGothic" panose="020B0603020101020101" pitchFamily="34" charset="-127"/>
                 <a:ea typeface="NanumBarunGothic" panose="020B0603020101020101" pitchFamily="34" charset="-127"/>
               </a:rPr>
@@ -6199,6 +6202,9 @@
             </a:pPr>
             <a:r>
               <a:rPr lang="en-US" altLang="ko-KR" sz="1200" dirty="0">
+                <a:solidFill>
+                  <a:schemeClr val="accent6"/>
+                </a:solidFill>
                 <a:latin typeface="NanumBarunGothic" panose="020B0603020101020101" pitchFamily="34" charset="-127"/>
                 <a:ea typeface="NanumBarunGothic" panose="020B0603020101020101" pitchFamily="34" charset="-127"/>
               </a:rPr>
@@ -6206,6 +6212,9 @@
             </a:r>
             <a:r>
               <a:rPr lang="ko-KR" altLang="en-US" sz="1200" dirty="0" err="1">
+                <a:solidFill>
+                  <a:schemeClr val="accent6"/>
+                </a:solidFill>
                 <a:latin typeface="NanumBarunGothic" panose="020B0603020101020101" pitchFamily="34" charset="-127"/>
                 <a:ea typeface="NanumBarunGothic" panose="020B0603020101020101" pitchFamily="34" charset="-127"/>
               </a:rPr>
@@ -6213,6 +6222,9 @@
             </a:r>
             <a:r>
               <a:rPr lang="ko-KR" altLang="en-US" sz="1200" dirty="0">
+                <a:solidFill>
+                  <a:schemeClr val="accent6"/>
+                </a:solidFill>
                 <a:latin typeface="NanumBarunGothic" panose="020B0603020101020101" pitchFamily="34" charset="-127"/>
                 <a:ea typeface="NanumBarunGothic" panose="020B0603020101020101" pitchFamily="34" charset="-127"/>
               </a:rPr>
@@ -6220,6 +6232,9 @@
             </a:r>
             <a:r>
               <a:rPr lang="en-US" altLang="ko-KR" sz="1200" dirty="0">
+                <a:solidFill>
+                  <a:schemeClr val="accent6"/>
+                </a:solidFill>
                 <a:latin typeface="NanumBarunGothic" panose="020B0603020101020101" pitchFamily="34" charset="-127"/>
                 <a:ea typeface="NanumBarunGothic" panose="020B0603020101020101" pitchFamily="34" charset="-127"/>
               </a:rPr>

</xml_diff>

<commit_message>
Response reviewer's comments: 1. Table 3 shows that syllable-based system shows better performance in written and spoken. It shows way better performance than dictionary-based(written) even with written data set. Is there any specific reason why the syllable-based shows better performance? It might be better to describe some insights for this. 2. Table 4 shows that Dictionary-based rerank shows better performance in all cases. However, the syllable-based shows a competitive performance in UC+EC (written and spoken). Can you explain or conjecture why that happened? 3. Page 9: 5th line from the left-bottom: These performance improvements.... : it's very difficult to agree this with Table 4 for UC+EC (written and spoken).  The differences with syllable-based is marginal at best.
</commit_message>
<xml_diff>
--- a/contents/review.pptx
+++ b/contents/review.pptx
@@ -6734,7 +6734,7 @@
               <a:buNone/>
             </a:pPr>
             <a:r>
-              <a:rPr lang="en-US" altLang="ko-KR" sz="1200">
+              <a:rPr lang="en-US" altLang="ko-KR" sz="1200" dirty="0">
                 <a:solidFill>
                   <a:schemeClr val="bg1">
                     <a:lumMod val="75000"/>
@@ -6754,7 +6754,7 @@
               <a:buNone/>
             </a:pPr>
             <a:r>
-              <a:rPr lang="en-US" altLang="ko-KR" sz="1200">
+              <a:rPr lang="en-US" altLang="ko-KR" sz="1200" dirty="0">
                 <a:solidFill>
                   <a:schemeClr val="bg1">
                     <a:lumMod val="75000"/>
@@ -6774,7 +6774,10 @@
               <a:buNone/>
             </a:pPr>
             <a:r>
-              <a:rPr lang="en-US" altLang="ko-KR" sz="1200">
+              <a:rPr lang="en-US" altLang="ko-KR" sz="1200" dirty="0">
+                <a:solidFill>
+                  <a:schemeClr val="accent6"/>
+                </a:solidFill>
                 <a:latin typeface="NanumBarunGothic" panose="020B0603020101020101" pitchFamily="34" charset="-127"/>
                 <a:ea typeface="NanumBarunGothic" panose="020B0603020101020101" pitchFamily="34" charset="-127"/>
               </a:rPr>
@@ -6789,11 +6792,34 @@
               <a:buNone/>
             </a:pPr>
             <a:r>
-              <a:rPr lang="en-US" altLang="ko-KR" sz="1200">
-                <a:latin typeface="NanumBarunGothic" panose="020B0603020101020101" pitchFamily="34" charset="-127"/>
-                <a:ea typeface="NanumBarunGothic" panose="020B0603020101020101" pitchFamily="34" charset="-127"/>
-              </a:rPr>
-              <a:t>2. Table 4 shows that Dictionary-based rerank shows better performance in all cases. However, the syllable-based shows a competitive performance in UC+EC (written and spoken). Can you explain or conjecture why that happened?</a:t>
+              <a:rPr lang="en-US" altLang="ko-KR" sz="1200" dirty="0">
+                <a:solidFill>
+                  <a:schemeClr val="accent6"/>
+                </a:solidFill>
+                <a:latin typeface="NanumBarunGothic" panose="020B0603020101020101" pitchFamily="34" charset="-127"/>
+                <a:ea typeface="NanumBarunGothic" panose="020B0603020101020101" pitchFamily="34" charset="-127"/>
+              </a:rPr>
+              <a:t>2. Table 4 shows that Dictionary-based </a:t>
+            </a:r>
+            <a:r>
+              <a:rPr lang="en-US" altLang="ko-KR" sz="1200" dirty="0" err="1">
+                <a:solidFill>
+                  <a:schemeClr val="accent6"/>
+                </a:solidFill>
+                <a:latin typeface="NanumBarunGothic" panose="020B0603020101020101" pitchFamily="34" charset="-127"/>
+                <a:ea typeface="NanumBarunGothic" panose="020B0603020101020101" pitchFamily="34" charset="-127"/>
+              </a:rPr>
+              <a:t>rerank</a:t>
+            </a:r>
+            <a:r>
+              <a:rPr lang="en-US" altLang="ko-KR" sz="1200" dirty="0">
+                <a:solidFill>
+                  <a:schemeClr val="accent6"/>
+                </a:solidFill>
+                <a:latin typeface="NanumBarunGothic" panose="020B0603020101020101" pitchFamily="34" charset="-127"/>
+                <a:ea typeface="NanumBarunGothic" panose="020B0603020101020101" pitchFamily="34" charset="-127"/>
+              </a:rPr>
+              <a:t> shows better performance in all cases. However, the syllable-based shows a competitive performance in UC+EC (written and spoken). Can you explain or conjecture why that happened?</a:t>
             </a:r>
           </a:p>
           <a:p>
@@ -6804,7 +6830,10 @@
               <a:buNone/>
             </a:pPr>
             <a:r>
-              <a:rPr lang="en-US" altLang="ko-KR" sz="1200">
+              <a:rPr lang="en-US" altLang="ko-KR" sz="1200" dirty="0">
+                <a:solidFill>
+                  <a:schemeClr val="accent6"/>
+                </a:solidFill>
                 <a:latin typeface="NanumBarunGothic" panose="020B0603020101020101" pitchFamily="34" charset="-127"/>
                 <a:ea typeface="NanumBarunGothic" panose="020B0603020101020101" pitchFamily="34" charset="-127"/>
               </a:rPr>
@@ -6819,11 +6848,25 @@
               <a:buNone/>
             </a:pPr>
             <a:r>
-              <a:rPr lang="en-US" altLang="ko-KR" sz="1200">
-                <a:latin typeface="NanumBarunGothic" panose="020B0603020101020101" pitchFamily="34" charset="-127"/>
-                <a:ea typeface="NanumBarunGothic" panose="020B0603020101020101" pitchFamily="34" charset="-127"/>
-              </a:rPr>
-              <a:t>4. Table 5: Sejong data shows poor performance in other approaches and proposed with rerank shows the better performance (from Table 3 and 4). However, Table 5 does not show any huge improvement compared to other approaches. Did you try with other dataset? Not sure how much improvement it will show with others.</a:t>
+              <a:rPr lang="en-US" altLang="ko-KR" sz="1200" dirty="0">
+                <a:latin typeface="NanumBarunGothic" panose="020B0603020101020101" pitchFamily="34" charset="-127"/>
+                <a:ea typeface="NanumBarunGothic" panose="020B0603020101020101" pitchFamily="34" charset="-127"/>
+              </a:rPr>
+              <a:t>4. Table 5: Sejong data shows poor performance in other approaches and proposed with </a:t>
+            </a:r>
+            <a:r>
+              <a:rPr lang="en-US" altLang="ko-KR" sz="1200" dirty="0" err="1">
+                <a:latin typeface="NanumBarunGothic" panose="020B0603020101020101" pitchFamily="34" charset="-127"/>
+                <a:ea typeface="NanumBarunGothic" panose="020B0603020101020101" pitchFamily="34" charset="-127"/>
+              </a:rPr>
+              <a:t>rerank</a:t>
+            </a:r>
+            <a:r>
+              <a:rPr lang="en-US" altLang="ko-KR" sz="1200" dirty="0">
+                <a:latin typeface="NanumBarunGothic" panose="020B0603020101020101" pitchFamily="34" charset="-127"/>
+                <a:ea typeface="NanumBarunGothic" panose="020B0603020101020101" pitchFamily="34" charset="-127"/>
+              </a:rPr>
+              <a:t> shows the better performance (from Table 3 and 4). However, Table 5 does not show any huge improvement compared to other approaches. Did you try with other dataset? Not sure how much improvement it will show with others.</a:t>
             </a:r>
           </a:p>
         </p:txBody>
@@ -6863,7 +6906,7 @@
               <a:buNone/>
             </a:pPr>
             <a:r>
-              <a:rPr lang="ko-KR" altLang="en-US" sz="1200">
+              <a:rPr lang="ko-KR" altLang="en-US" sz="1200" dirty="0">
                 <a:solidFill>
                   <a:schemeClr val="bg1">
                     <a:lumMod val="75000"/>
@@ -6875,7 +6918,7 @@
               <a:t>매우 흥미로운 논문입니다</a:t>
             </a:r>
             <a:r>
-              <a:rPr lang="en-US" altLang="ko-KR" sz="1200">
+              <a:rPr lang="en-US" altLang="ko-KR" sz="1200" dirty="0">
                 <a:solidFill>
                   <a:schemeClr val="bg1">
                     <a:lumMod val="75000"/>
@@ -6895,7 +6938,7 @@
               <a:buNone/>
             </a:pPr>
             <a:r>
-              <a:rPr lang="ko-KR" altLang="en-US" sz="1200">
+              <a:rPr lang="ko-KR" altLang="en-US" sz="1200" dirty="0">
                 <a:solidFill>
                   <a:schemeClr val="bg1">
                     <a:lumMod val="75000"/>
@@ -6907,7 +6950,7 @@
               <a:t>전반적으로 체계적이고 잘 작성되었습니다</a:t>
             </a:r>
             <a:r>
-              <a:rPr lang="en-US" altLang="ko-KR" sz="1200">
+              <a:rPr lang="en-US" altLang="ko-KR" sz="1200" dirty="0">
                 <a:solidFill>
                   <a:schemeClr val="bg1">
                     <a:lumMod val="75000"/>
@@ -6919,7 +6962,7 @@
               <a:t>. </a:t>
             </a:r>
             <a:r>
-              <a:rPr lang="ko-KR" altLang="en-US" sz="1200">
+              <a:rPr lang="ko-KR" altLang="en-US" sz="1200" dirty="0">
                 <a:solidFill>
                   <a:schemeClr val="bg1">
                     <a:lumMod val="75000"/>
@@ -6931,7 +6974,7 @@
               <a:t>다음은 몇 가지 의견입니다</a:t>
             </a:r>
             <a:r>
-              <a:rPr lang="en-US" altLang="ko-KR" sz="1200">
+              <a:rPr lang="en-US" altLang="ko-KR" sz="1200" dirty="0">
                 <a:solidFill>
                   <a:schemeClr val="bg1">
                     <a:lumMod val="75000"/>
@@ -6951,91 +6994,130 @@
               <a:buNone/>
             </a:pPr>
             <a:r>
-              <a:rPr lang="en-US" altLang="ko-KR" sz="1200">
+              <a:rPr lang="en-US" altLang="ko-KR" sz="1200" dirty="0">
+                <a:solidFill>
+                  <a:schemeClr val="accent6"/>
+                </a:solidFill>
                 <a:latin typeface="NanumBarunGothic" panose="020B0603020101020101" pitchFamily="34" charset="-127"/>
                 <a:ea typeface="NanumBarunGothic" panose="020B0603020101020101" pitchFamily="34" charset="-127"/>
               </a:rPr>
               <a:t>1. </a:t>
             </a:r>
             <a:r>
-              <a:rPr lang="ko-KR" altLang="en-US" sz="1200">
+              <a:rPr lang="ko-KR" altLang="en-US" sz="1200" dirty="0">
+                <a:solidFill>
+                  <a:schemeClr val="accent6"/>
+                </a:solidFill>
                 <a:latin typeface="NanumBarunGothic" panose="020B0603020101020101" pitchFamily="34" charset="-127"/>
                 <a:ea typeface="NanumBarunGothic" panose="020B0603020101020101" pitchFamily="34" charset="-127"/>
               </a:rPr>
               <a:t>표 </a:t>
             </a:r>
             <a:r>
-              <a:rPr lang="en-US" altLang="ko-KR" sz="1200">
+              <a:rPr lang="en-US" altLang="ko-KR" sz="1200" dirty="0">
+                <a:solidFill>
+                  <a:schemeClr val="accent6"/>
+                </a:solidFill>
                 <a:latin typeface="NanumBarunGothic" panose="020B0603020101020101" pitchFamily="34" charset="-127"/>
                 <a:ea typeface="NanumBarunGothic" panose="020B0603020101020101" pitchFamily="34" charset="-127"/>
               </a:rPr>
               <a:t>3</a:t>
             </a:r>
             <a:r>
-              <a:rPr lang="ko-KR" altLang="en-US" sz="1200">
+              <a:rPr lang="ko-KR" altLang="en-US" sz="1200" dirty="0">
+                <a:solidFill>
+                  <a:schemeClr val="accent6"/>
+                </a:solidFill>
                 <a:latin typeface="NanumBarunGothic" panose="020B0603020101020101" pitchFamily="34" charset="-127"/>
                 <a:ea typeface="NanumBarunGothic" panose="020B0603020101020101" pitchFamily="34" charset="-127"/>
               </a:rPr>
               <a:t>을 보면 음절 기반 시스템이 쓰기와 말하기에서 더 나은 성능을 보여줍니다</a:t>
             </a:r>
             <a:r>
-              <a:rPr lang="en-US" altLang="ko-KR" sz="1200">
+              <a:rPr lang="en-US" altLang="ko-KR" sz="1200" dirty="0">
+                <a:solidFill>
+                  <a:schemeClr val="accent6"/>
+                </a:solidFill>
                 <a:latin typeface="NanumBarunGothic" panose="020B0603020101020101" pitchFamily="34" charset="-127"/>
                 <a:ea typeface="NanumBarunGothic" panose="020B0603020101020101" pitchFamily="34" charset="-127"/>
               </a:rPr>
               <a:t>. </a:t>
             </a:r>
             <a:r>
-              <a:rPr lang="ko-KR" altLang="en-US" sz="1200">
+              <a:rPr lang="ko-KR" altLang="en-US" sz="1200" dirty="0">
+                <a:solidFill>
+                  <a:schemeClr val="accent6"/>
+                </a:solidFill>
                 <a:latin typeface="NanumBarunGothic" panose="020B0603020101020101" pitchFamily="34" charset="-127"/>
                 <a:ea typeface="NanumBarunGothic" panose="020B0603020101020101" pitchFamily="34" charset="-127"/>
               </a:rPr>
               <a:t>심지어는 사전 기반</a:t>
             </a:r>
             <a:r>
-              <a:rPr lang="en-US" altLang="ko-KR" sz="1200">
+              <a:rPr lang="en-US" altLang="ko-KR" sz="1200" dirty="0">
+                <a:solidFill>
+                  <a:schemeClr val="accent6"/>
+                </a:solidFill>
                 <a:latin typeface="NanumBarunGothic" panose="020B0603020101020101" pitchFamily="34" charset="-127"/>
                 <a:ea typeface="NanumBarunGothic" panose="020B0603020101020101" pitchFamily="34" charset="-127"/>
               </a:rPr>
               <a:t>(written)</a:t>
             </a:r>
             <a:r>
-              <a:rPr lang="ko-KR" altLang="en-US" sz="1200">
+              <a:rPr lang="ko-KR" altLang="en-US" sz="1200" dirty="0">
+                <a:solidFill>
+                  <a:schemeClr val="accent6"/>
+                </a:solidFill>
                 <a:latin typeface="NanumBarunGothic" panose="020B0603020101020101" pitchFamily="34" charset="-127"/>
                 <a:ea typeface="NanumBarunGothic" panose="020B0603020101020101" pitchFamily="34" charset="-127"/>
               </a:rPr>
               <a:t>보다 훨씬 더 나은 성능을 보여줍니다</a:t>
             </a:r>
             <a:r>
-              <a:rPr lang="en-US" altLang="ko-KR" sz="1200">
+              <a:rPr lang="en-US" altLang="ko-KR" sz="1200" dirty="0">
+                <a:solidFill>
+                  <a:schemeClr val="accent6"/>
+                </a:solidFill>
                 <a:latin typeface="NanumBarunGothic" panose="020B0603020101020101" pitchFamily="34" charset="-127"/>
                 <a:ea typeface="NanumBarunGothic" panose="020B0603020101020101" pitchFamily="34" charset="-127"/>
               </a:rPr>
               <a:t>. </a:t>
             </a:r>
             <a:r>
-              <a:rPr lang="ko-KR" altLang="en-US" sz="1200">
+              <a:rPr lang="ko-KR" altLang="en-US" sz="1200" dirty="0">
+                <a:solidFill>
+                  <a:schemeClr val="accent6"/>
+                </a:solidFill>
                 <a:latin typeface="NanumBarunGothic" panose="020B0603020101020101" pitchFamily="34" charset="-127"/>
                 <a:ea typeface="NanumBarunGothic" panose="020B0603020101020101" pitchFamily="34" charset="-127"/>
               </a:rPr>
               <a:t>음절 기반이 더 나은 성능을 보이는 특별한 이유가 있나요</a:t>
             </a:r>
             <a:r>
-              <a:rPr lang="en-US" altLang="ko-KR" sz="1200">
+              <a:rPr lang="en-US" altLang="ko-KR" sz="1200" dirty="0">
+                <a:solidFill>
+                  <a:schemeClr val="accent6"/>
+                </a:solidFill>
                 <a:latin typeface="NanumBarunGothic" panose="020B0603020101020101" pitchFamily="34" charset="-127"/>
                 <a:ea typeface="NanumBarunGothic" panose="020B0603020101020101" pitchFamily="34" charset="-127"/>
               </a:rPr>
               <a:t>? </a:t>
             </a:r>
             <a:r>
-              <a:rPr lang="ko-KR" altLang="en-US" sz="1200">
+              <a:rPr lang="ko-KR" altLang="en-US" sz="1200" dirty="0">
+                <a:solidFill>
+                  <a:schemeClr val="accent6"/>
+                </a:solidFill>
                 <a:latin typeface="NanumBarunGothic" panose="020B0603020101020101" pitchFamily="34" charset="-127"/>
                 <a:ea typeface="NanumBarunGothic" panose="020B0603020101020101" pitchFamily="34" charset="-127"/>
               </a:rPr>
               <a:t>이에 대한 통찰을 설명해 주시면 좋을 것 같습니다</a:t>
             </a:r>
             <a:r>
-              <a:rPr lang="en-US" altLang="ko-KR" sz="1200">
+              <a:rPr lang="en-US" altLang="ko-KR" sz="1200" dirty="0">
+                <a:solidFill>
+                  <a:schemeClr val="accent6"/>
+                </a:solidFill>
                 <a:latin typeface="NanumBarunGothic" panose="020B0603020101020101" pitchFamily="34" charset="-127"/>
                 <a:ea typeface="NanumBarunGothic" panose="020B0603020101020101" pitchFamily="34" charset="-127"/>
               </a:rPr>
@@ -7050,77 +7132,110 @@
               <a:buNone/>
             </a:pPr>
             <a:r>
-              <a:rPr lang="en-US" altLang="ko-KR" sz="1200">
+              <a:rPr lang="en-US" altLang="ko-KR" sz="1200" dirty="0">
+                <a:solidFill>
+                  <a:schemeClr val="accent6"/>
+                </a:solidFill>
                 <a:latin typeface="NanumBarunGothic" panose="020B0603020101020101" pitchFamily="34" charset="-127"/>
                 <a:ea typeface="NanumBarunGothic" panose="020B0603020101020101" pitchFamily="34" charset="-127"/>
               </a:rPr>
               <a:t>2. </a:t>
             </a:r>
             <a:r>
-              <a:rPr lang="ko-KR" altLang="en-US" sz="1200">
+              <a:rPr lang="ko-KR" altLang="en-US" sz="1200" dirty="0">
+                <a:solidFill>
+                  <a:schemeClr val="accent6"/>
+                </a:solidFill>
                 <a:latin typeface="NanumBarunGothic" panose="020B0603020101020101" pitchFamily="34" charset="-127"/>
                 <a:ea typeface="NanumBarunGothic" panose="020B0603020101020101" pitchFamily="34" charset="-127"/>
               </a:rPr>
               <a:t>표 </a:t>
             </a:r>
             <a:r>
-              <a:rPr lang="en-US" altLang="ko-KR" sz="1200">
+              <a:rPr lang="en-US" altLang="ko-KR" sz="1200" dirty="0">
+                <a:solidFill>
+                  <a:schemeClr val="accent6"/>
+                </a:solidFill>
                 <a:latin typeface="NanumBarunGothic" panose="020B0603020101020101" pitchFamily="34" charset="-127"/>
                 <a:ea typeface="NanumBarunGothic" panose="020B0603020101020101" pitchFamily="34" charset="-127"/>
               </a:rPr>
               <a:t>4</a:t>
             </a:r>
             <a:r>
-              <a:rPr lang="ko-KR" altLang="en-US" sz="1200">
+              <a:rPr lang="ko-KR" altLang="en-US" sz="1200" dirty="0">
+                <a:solidFill>
+                  <a:schemeClr val="accent6"/>
+                </a:solidFill>
                 <a:latin typeface="NanumBarunGothic" panose="020B0603020101020101" pitchFamily="34" charset="-127"/>
                 <a:ea typeface="NanumBarunGothic" panose="020B0603020101020101" pitchFamily="34" charset="-127"/>
               </a:rPr>
               <a:t>를 보면 사전 기반 재순위가 모든 경우에서 더 나은 성능을 보여줍니다</a:t>
             </a:r>
             <a:r>
-              <a:rPr lang="en-US" altLang="ko-KR" sz="1200">
+              <a:rPr lang="en-US" altLang="ko-KR" sz="1200" dirty="0">
+                <a:solidFill>
+                  <a:schemeClr val="accent6"/>
+                </a:solidFill>
                 <a:latin typeface="NanumBarunGothic" panose="020B0603020101020101" pitchFamily="34" charset="-127"/>
                 <a:ea typeface="NanumBarunGothic" panose="020B0603020101020101" pitchFamily="34" charset="-127"/>
               </a:rPr>
               <a:t>. </a:t>
             </a:r>
             <a:r>
-              <a:rPr lang="ko-KR" altLang="en-US" sz="1200">
+              <a:rPr lang="ko-KR" altLang="en-US" sz="1200" dirty="0">
+                <a:solidFill>
+                  <a:schemeClr val="accent6"/>
+                </a:solidFill>
                 <a:latin typeface="NanumBarunGothic" panose="020B0603020101020101" pitchFamily="34" charset="-127"/>
                 <a:ea typeface="NanumBarunGothic" panose="020B0603020101020101" pitchFamily="34" charset="-127"/>
               </a:rPr>
               <a:t>그러나 음절 기반은 </a:t>
             </a:r>
             <a:r>
-              <a:rPr lang="en-US" altLang="ko-KR" sz="1200">
+              <a:rPr lang="en-US" altLang="ko-KR" sz="1200" dirty="0">
+                <a:solidFill>
+                  <a:schemeClr val="accent6"/>
+                </a:solidFill>
                 <a:latin typeface="NanumBarunGothic" panose="020B0603020101020101" pitchFamily="34" charset="-127"/>
                 <a:ea typeface="NanumBarunGothic" panose="020B0603020101020101" pitchFamily="34" charset="-127"/>
               </a:rPr>
               <a:t>UC+EC(written and spoken)</a:t>
             </a:r>
             <a:r>
-              <a:rPr lang="ko-KR" altLang="en-US" sz="1200">
+              <a:rPr lang="ko-KR" altLang="en-US" sz="1200" dirty="0">
+                <a:solidFill>
+                  <a:schemeClr val="accent6"/>
+                </a:solidFill>
                 <a:latin typeface="NanumBarunGothic" panose="020B0603020101020101" pitchFamily="34" charset="-127"/>
                 <a:ea typeface="NanumBarunGothic" panose="020B0603020101020101" pitchFamily="34" charset="-127"/>
               </a:rPr>
               <a:t>에서 경쟁력이 있는 성능을 보여줍니다</a:t>
             </a:r>
             <a:r>
-              <a:rPr lang="en-US" altLang="ko-KR" sz="1200">
+              <a:rPr lang="en-US" altLang="ko-KR" sz="1200" dirty="0">
+                <a:solidFill>
+                  <a:schemeClr val="accent6"/>
+                </a:solidFill>
                 <a:latin typeface="NanumBarunGothic" panose="020B0603020101020101" pitchFamily="34" charset="-127"/>
                 <a:ea typeface="NanumBarunGothic" panose="020B0603020101020101" pitchFamily="34" charset="-127"/>
               </a:rPr>
               <a:t>. </a:t>
             </a:r>
             <a:r>
-              <a:rPr lang="ko-KR" altLang="en-US" sz="1200">
+              <a:rPr lang="ko-KR" altLang="en-US" sz="1200" dirty="0">
+                <a:solidFill>
+                  <a:schemeClr val="accent6"/>
+                </a:solidFill>
                 <a:latin typeface="NanumBarunGothic" panose="020B0603020101020101" pitchFamily="34" charset="-127"/>
                 <a:ea typeface="NanumBarunGothic" panose="020B0603020101020101" pitchFamily="34" charset="-127"/>
               </a:rPr>
               <a:t>그 이유를 설명하거나 추측할 수 있나요</a:t>
             </a:r>
             <a:r>
-              <a:rPr lang="en-US" altLang="ko-KR" sz="1200">
+              <a:rPr lang="en-US" altLang="ko-KR" sz="1200" dirty="0">
+                <a:solidFill>
+                  <a:schemeClr val="accent6"/>
+                </a:solidFill>
                 <a:latin typeface="NanumBarunGothic" panose="020B0603020101020101" pitchFamily="34" charset="-127"/>
                 <a:ea typeface="NanumBarunGothic" panose="020B0603020101020101" pitchFamily="34" charset="-127"/>
               </a:rPr>
@@ -7135,105 +7250,150 @@
               <a:buNone/>
             </a:pPr>
             <a:r>
-              <a:rPr lang="en-US" altLang="ko-KR" sz="1200">
+              <a:rPr lang="en-US" altLang="ko-KR" sz="1200" dirty="0">
+                <a:solidFill>
+                  <a:schemeClr val="accent6"/>
+                </a:solidFill>
                 <a:latin typeface="NanumBarunGothic" panose="020B0603020101020101" pitchFamily="34" charset="-127"/>
                 <a:ea typeface="NanumBarunGothic" panose="020B0603020101020101" pitchFamily="34" charset="-127"/>
               </a:rPr>
               <a:t>3. 9</a:t>
             </a:r>
             <a:r>
-              <a:rPr lang="ko-KR" altLang="en-US" sz="1200">
+              <a:rPr lang="ko-KR" altLang="en-US" sz="1200" dirty="0">
+                <a:solidFill>
+                  <a:schemeClr val="accent6"/>
+                </a:solidFill>
                 <a:latin typeface="NanumBarunGothic" panose="020B0603020101020101" pitchFamily="34" charset="-127"/>
                 <a:ea typeface="NanumBarunGothic" panose="020B0603020101020101" pitchFamily="34" charset="-127"/>
               </a:rPr>
               <a:t>페이지</a:t>
             </a:r>
             <a:r>
-              <a:rPr lang="en-US" altLang="ko-KR" sz="1200">
+              <a:rPr lang="en-US" altLang="ko-KR" sz="1200" dirty="0">
+                <a:solidFill>
+                  <a:schemeClr val="accent6"/>
+                </a:solidFill>
                 <a:latin typeface="NanumBarunGothic" panose="020B0603020101020101" pitchFamily="34" charset="-127"/>
                 <a:ea typeface="NanumBarunGothic" panose="020B0603020101020101" pitchFamily="34" charset="-127"/>
               </a:rPr>
               <a:t>: </a:t>
             </a:r>
             <a:r>
-              <a:rPr lang="ko-KR" altLang="en-US" sz="1200">
+              <a:rPr lang="ko-KR" altLang="en-US" sz="1200" dirty="0">
+                <a:solidFill>
+                  <a:schemeClr val="accent6"/>
+                </a:solidFill>
                 <a:latin typeface="NanumBarunGothic" panose="020B0603020101020101" pitchFamily="34" charset="-127"/>
                 <a:ea typeface="NanumBarunGothic" panose="020B0603020101020101" pitchFamily="34" charset="-127"/>
               </a:rPr>
               <a:t>왼쪽 아래에서 다섯 번째 줄</a:t>
             </a:r>
             <a:r>
-              <a:rPr lang="en-US" altLang="ko-KR" sz="1200">
+              <a:rPr lang="en-US" altLang="ko-KR" sz="1200" dirty="0">
+                <a:solidFill>
+                  <a:schemeClr val="accent6"/>
+                </a:solidFill>
                 <a:latin typeface="NanumBarunGothic" panose="020B0603020101020101" pitchFamily="34" charset="-127"/>
                 <a:ea typeface="NanumBarunGothic" panose="020B0603020101020101" pitchFamily="34" charset="-127"/>
               </a:rPr>
               <a:t>: </a:t>
             </a:r>
             <a:r>
-              <a:rPr lang="ko-KR" altLang="en-US" sz="1200">
+              <a:rPr lang="ko-KR" altLang="en-US" sz="1200" dirty="0">
+                <a:solidFill>
+                  <a:schemeClr val="accent6"/>
+                </a:solidFill>
                 <a:latin typeface="NanumBarunGothic" panose="020B0603020101020101" pitchFamily="34" charset="-127"/>
                 <a:ea typeface="NanumBarunGothic" panose="020B0603020101020101" pitchFamily="34" charset="-127"/>
               </a:rPr>
               <a:t>이러한 성능 향상</a:t>
             </a:r>
             <a:r>
-              <a:rPr lang="en-US" altLang="ko-KR" sz="1200">
+              <a:rPr lang="en-US" altLang="ko-KR" sz="1200" dirty="0">
+                <a:solidFill>
+                  <a:schemeClr val="accent6"/>
+                </a:solidFill>
                 <a:latin typeface="NanumBarunGothic" panose="020B0603020101020101" pitchFamily="34" charset="-127"/>
                 <a:ea typeface="NanumBarunGothic" panose="020B0603020101020101" pitchFamily="34" charset="-127"/>
               </a:rPr>
               <a:t>.... UC+EC(written </a:t>
             </a:r>
             <a:r>
-              <a:rPr lang="ko-KR" altLang="en-US" sz="1200">
+              <a:rPr lang="ko-KR" altLang="en-US" sz="1200" dirty="0">
+                <a:solidFill>
+                  <a:schemeClr val="accent6"/>
+                </a:solidFill>
                 <a:latin typeface="NanumBarunGothic" panose="020B0603020101020101" pitchFamily="34" charset="-127"/>
                 <a:ea typeface="NanumBarunGothic" panose="020B0603020101020101" pitchFamily="34" charset="-127"/>
               </a:rPr>
               <a:t>및 </a:t>
             </a:r>
             <a:r>
-              <a:rPr lang="en-US" altLang="ko-KR" sz="1200">
+              <a:rPr lang="en-US" altLang="ko-KR" sz="1200" dirty="0">
+                <a:solidFill>
+                  <a:schemeClr val="accent6"/>
+                </a:solidFill>
                 <a:latin typeface="NanumBarunGothic" panose="020B0603020101020101" pitchFamily="34" charset="-127"/>
                 <a:ea typeface="NanumBarunGothic" panose="020B0603020101020101" pitchFamily="34" charset="-127"/>
               </a:rPr>
               <a:t>spoken)</a:t>
             </a:r>
             <a:r>
-              <a:rPr lang="ko-KR" altLang="en-US" sz="1200">
+              <a:rPr lang="ko-KR" altLang="en-US" sz="1200" dirty="0">
+                <a:solidFill>
+                  <a:schemeClr val="accent6"/>
+                </a:solidFill>
                 <a:latin typeface="NanumBarunGothic" panose="020B0603020101020101" pitchFamily="34" charset="-127"/>
                 <a:ea typeface="NanumBarunGothic" panose="020B0603020101020101" pitchFamily="34" charset="-127"/>
               </a:rPr>
               <a:t>의 경우 표 </a:t>
             </a:r>
             <a:r>
-              <a:rPr lang="en-US" altLang="ko-KR" sz="1200">
+              <a:rPr lang="en-US" altLang="ko-KR" sz="1200" dirty="0">
+                <a:solidFill>
+                  <a:schemeClr val="accent6"/>
+                </a:solidFill>
                 <a:latin typeface="NanumBarunGothic" panose="020B0603020101020101" pitchFamily="34" charset="-127"/>
                 <a:ea typeface="NanumBarunGothic" panose="020B0603020101020101" pitchFamily="34" charset="-127"/>
               </a:rPr>
               <a:t>4</a:t>
             </a:r>
             <a:r>
-              <a:rPr lang="ko-KR" altLang="en-US" sz="1200">
+              <a:rPr lang="ko-KR" altLang="en-US" sz="1200" dirty="0">
+                <a:solidFill>
+                  <a:schemeClr val="accent6"/>
+                </a:solidFill>
                 <a:latin typeface="NanumBarunGothic" panose="020B0603020101020101" pitchFamily="34" charset="-127"/>
                 <a:ea typeface="NanumBarunGothic" panose="020B0603020101020101" pitchFamily="34" charset="-127"/>
               </a:rPr>
               <a:t>에 동의하기가 매우 어렵습니다</a:t>
             </a:r>
             <a:r>
-              <a:rPr lang="en-US" altLang="ko-KR" sz="1200">
+              <a:rPr lang="en-US" altLang="ko-KR" sz="1200" dirty="0">
+                <a:solidFill>
+                  <a:schemeClr val="accent6"/>
+                </a:solidFill>
                 <a:latin typeface="NanumBarunGothic" panose="020B0603020101020101" pitchFamily="34" charset="-127"/>
                 <a:ea typeface="NanumBarunGothic" panose="020B0603020101020101" pitchFamily="34" charset="-127"/>
               </a:rPr>
               <a:t>.  </a:t>
             </a:r>
             <a:r>
-              <a:rPr lang="ko-KR" altLang="en-US" sz="1200">
+              <a:rPr lang="ko-KR" altLang="en-US" sz="1200" dirty="0">
+                <a:solidFill>
+                  <a:schemeClr val="accent6"/>
+                </a:solidFill>
                 <a:latin typeface="NanumBarunGothic" panose="020B0603020101020101" pitchFamily="34" charset="-127"/>
                 <a:ea typeface="NanumBarunGothic" panose="020B0603020101020101" pitchFamily="34" charset="-127"/>
               </a:rPr>
               <a:t>음절 기반과의 차이는 기껏해야 미미합니다</a:t>
             </a:r>
             <a:r>
-              <a:rPr lang="en-US" altLang="ko-KR" sz="1200">
+              <a:rPr lang="en-US" altLang="ko-KR" sz="1200" dirty="0">
+                <a:solidFill>
+                  <a:schemeClr val="accent6"/>
+                </a:solidFill>
                 <a:latin typeface="NanumBarunGothic" panose="020B0603020101020101" pitchFamily="34" charset="-127"/>
                 <a:ea typeface="NanumBarunGothic" panose="020B0603020101020101" pitchFamily="34" charset="-127"/>
               </a:rPr>
@@ -7248,153 +7408,153 @@
               <a:buNone/>
             </a:pPr>
             <a:r>
-              <a:rPr lang="en-US" altLang="ko-KR" sz="1200">
+              <a:rPr lang="en-US" altLang="ko-KR" sz="1200" dirty="0">
                 <a:latin typeface="NanumBarunGothic" panose="020B0603020101020101" pitchFamily="34" charset="-127"/>
                 <a:ea typeface="NanumBarunGothic" panose="020B0603020101020101" pitchFamily="34" charset="-127"/>
               </a:rPr>
               <a:t>4. </a:t>
             </a:r>
             <a:r>
-              <a:rPr lang="ko-KR" altLang="en-US" sz="1200">
+              <a:rPr lang="ko-KR" altLang="en-US" sz="1200" dirty="0">
                 <a:latin typeface="NanumBarunGothic" panose="020B0603020101020101" pitchFamily="34" charset="-127"/>
                 <a:ea typeface="NanumBarunGothic" panose="020B0603020101020101" pitchFamily="34" charset="-127"/>
               </a:rPr>
               <a:t>표 </a:t>
             </a:r>
             <a:r>
-              <a:rPr lang="en-US" altLang="ko-KR" sz="1200">
+              <a:rPr lang="en-US" altLang="ko-KR" sz="1200" dirty="0">
                 <a:latin typeface="NanumBarunGothic" panose="020B0603020101020101" pitchFamily="34" charset="-127"/>
                 <a:ea typeface="NanumBarunGothic" panose="020B0603020101020101" pitchFamily="34" charset="-127"/>
               </a:rPr>
               <a:t>5: </a:t>
             </a:r>
             <a:r>
-              <a:rPr lang="ko-KR" altLang="en-US" sz="1200">
+              <a:rPr lang="ko-KR" altLang="en-US" sz="1200" dirty="0">
                 <a:latin typeface="NanumBarunGothic" panose="020B0603020101020101" pitchFamily="34" charset="-127"/>
                 <a:ea typeface="NanumBarunGothic" panose="020B0603020101020101" pitchFamily="34" charset="-127"/>
               </a:rPr>
               <a:t>세종 데이터는 다른 접근 방식에서 성능이 좋지 않으며</a:t>
             </a:r>
             <a:r>
-              <a:rPr lang="en-US" altLang="ko-KR" sz="1200">
+              <a:rPr lang="en-US" altLang="ko-KR" sz="1200" dirty="0">
                 <a:latin typeface="NanumBarunGothic" panose="020B0603020101020101" pitchFamily="34" charset="-127"/>
                 <a:ea typeface="NanumBarunGothic" panose="020B0603020101020101" pitchFamily="34" charset="-127"/>
               </a:rPr>
               <a:t>, </a:t>
             </a:r>
             <a:r>
-              <a:rPr lang="ko-KR" altLang="en-US" sz="1200">
+              <a:rPr lang="ko-KR" altLang="en-US" sz="1200" dirty="0">
                 <a:latin typeface="NanumBarunGothic" panose="020B0603020101020101" pitchFamily="34" charset="-127"/>
                 <a:ea typeface="NanumBarunGothic" panose="020B0603020101020101" pitchFamily="34" charset="-127"/>
               </a:rPr>
               <a:t>재순위화를 통해 제안한 방식이 더 나은 성능을 보여줍니다</a:t>
             </a:r>
             <a:r>
-              <a:rPr lang="en-US" altLang="ko-KR" sz="1200">
+              <a:rPr lang="en-US" altLang="ko-KR" sz="1200" dirty="0">
                 <a:latin typeface="NanumBarunGothic" panose="020B0603020101020101" pitchFamily="34" charset="-127"/>
                 <a:ea typeface="NanumBarunGothic" panose="020B0603020101020101" pitchFamily="34" charset="-127"/>
               </a:rPr>
               <a:t>(</a:t>
             </a:r>
             <a:r>
-              <a:rPr lang="ko-KR" altLang="en-US" sz="1200">
+              <a:rPr lang="ko-KR" altLang="en-US" sz="1200" dirty="0">
                 <a:latin typeface="NanumBarunGothic" panose="020B0603020101020101" pitchFamily="34" charset="-127"/>
                 <a:ea typeface="NanumBarunGothic" panose="020B0603020101020101" pitchFamily="34" charset="-127"/>
               </a:rPr>
               <a:t>표 </a:t>
             </a:r>
             <a:r>
-              <a:rPr lang="en-US" altLang="ko-KR" sz="1200">
+              <a:rPr lang="en-US" altLang="ko-KR" sz="1200" dirty="0">
                 <a:latin typeface="NanumBarunGothic" panose="020B0603020101020101" pitchFamily="34" charset="-127"/>
                 <a:ea typeface="NanumBarunGothic" panose="020B0603020101020101" pitchFamily="34" charset="-127"/>
               </a:rPr>
               <a:t>3</a:t>
             </a:r>
             <a:r>
-              <a:rPr lang="ko-KR" altLang="en-US" sz="1200">
+              <a:rPr lang="ko-KR" altLang="en-US" sz="1200" dirty="0">
                 <a:latin typeface="NanumBarunGothic" panose="020B0603020101020101" pitchFamily="34" charset="-127"/>
                 <a:ea typeface="NanumBarunGothic" panose="020B0603020101020101" pitchFamily="34" charset="-127"/>
               </a:rPr>
               <a:t>과 </a:t>
             </a:r>
             <a:r>
-              <a:rPr lang="en-US" altLang="ko-KR" sz="1200">
+              <a:rPr lang="en-US" altLang="ko-KR" sz="1200" dirty="0">
                 <a:latin typeface="NanumBarunGothic" panose="020B0603020101020101" pitchFamily="34" charset="-127"/>
                 <a:ea typeface="NanumBarunGothic" panose="020B0603020101020101" pitchFamily="34" charset="-127"/>
               </a:rPr>
               <a:t>4</a:t>
             </a:r>
             <a:r>
-              <a:rPr lang="ko-KR" altLang="en-US" sz="1200">
+              <a:rPr lang="ko-KR" altLang="en-US" sz="1200" dirty="0">
                 <a:latin typeface="NanumBarunGothic" panose="020B0603020101020101" pitchFamily="34" charset="-127"/>
                 <a:ea typeface="NanumBarunGothic" panose="020B0603020101020101" pitchFamily="34" charset="-127"/>
               </a:rPr>
               <a:t>에서</a:t>
             </a:r>
             <a:r>
-              <a:rPr lang="en-US" altLang="ko-KR" sz="1200">
+              <a:rPr lang="en-US" altLang="ko-KR" sz="1200" dirty="0">
                 <a:latin typeface="NanumBarunGothic" panose="020B0603020101020101" pitchFamily="34" charset="-127"/>
                 <a:ea typeface="NanumBarunGothic" panose="020B0603020101020101" pitchFamily="34" charset="-127"/>
               </a:rPr>
               <a:t>). </a:t>
             </a:r>
             <a:r>
-              <a:rPr lang="ko-KR" altLang="en-US" sz="1200">
+              <a:rPr lang="ko-KR" altLang="en-US" sz="1200" dirty="0">
                 <a:latin typeface="NanumBarunGothic" panose="020B0603020101020101" pitchFamily="34" charset="-127"/>
                 <a:ea typeface="NanumBarunGothic" panose="020B0603020101020101" pitchFamily="34" charset="-127"/>
               </a:rPr>
               <a:t>하지만 표 </a:t>
             </a:r>
             <a:r>
-              <a:rPr lang="en-US" altLang="ko-KR" sz="1200">
+              <a:rPr lang="en-US" altLang="ko-KR" sz="1200" dirty="0">
                 <a:latin typeface="NanumBarunGothic" panose="020B0603020101020101" pitchFamily="34" charset="-127"/>
                 <a:ea typeface="NanumBarunGothic" panose="020B0603020101020101" pitchFamily="34" charset="-127"/>
               </a:rPr>
               <a:t>5</a:t>
             </a:r>
             <a:r>
-              <a:rPr lang="ko-KR" altLang="en-US" sz="1200">
+              <a:rPr lang="ko-KR" altLang="en-US" sz="1200" dirty="0">
                 <a:latin typeface="NanumBarunGothic" panose="020B0603020101020101" pitchFamily="34" charset="-127"/>
                 <a:ea typeface="NanumBarunGothic" panose="020B0603020101020101" pitchFamily="34" charset="-127"/>
               </a:rPr>
               <a:t>는 다른 접근 방식과 비교했을 때 큰 개선을 보이지 않습니다</a:t>
             </a:r>
             <a:r>
-              <a:rPr lang="en-US" altLang="ko-KR" sz="1200">
+              <a:rPr lang="en-US" altLang="ko-KR" sz="1200" dirty="0">
                 <a:latin typeface="NanumBarunGothic" panose="020B0603020101020101" pitchFamily="34" charset="-127"/>
                 <a:ea typeface="NanumBarunGothic" panose="020B0603020101020101" pitchFamily="34" charset="-127"/>
               </a:rPr>
               <a:t>. </a:t>
             </a:r>
             <a:r>
-              <a:rPr lang="ko-KR" altLang="en-US" sz="1200">
+              <a:rPr lang="ko-KR" altLang="en-US" sz="1200" dirty="0">
                 <a:latin typeface="NanumBarunGothic" panose="020B0603020101020101" pitchFamily="34" charset="-127"/>
                 <a:ea typeface="NanumBarunGothic" panose="020B0603020101020101" pitchFamily="34" charset="-127"/>
               </a:rPr>
               <a:t>다른 데이터 집합으로 시도해 보셨나요</a:t>
             </a:r>
             <a:r>
-              <a:rPr lang="en-US" altLang="ko-KR" sz="1200">
+              <a:rPr lang="en-US" altLang="ko-KR" sz="1200" dirty="0">
                 <a:latin typeface="NanumBarunGothic" panose="020B0603020101020101" pitchFamily="34" charset="-127"/>
                 <a:ea typeface="NanumBarunGothic" panose="020B0603020101020101" pitchFamily="34" charset="-127"/>
               </a:rPr>
               <a:t>? </a:t>
             </a:r>
             <a:r>
-              <a:rPr lang="ko-KR" altLang="en-US" sz="1200">
+              <a:rPr lang="ko-KR" altLang="en-US" sz="1200" dirty="0">
                 <a:latin typeface="NanumBarunGothic" panose="020B0603020101020101" pitchFamily="34" charset="-127"/>
                 <a:ea typeface="NanumBarunGothic" panose="020B0603020101020101" pitchFamily="34" charset="-127"/>
               </a:rPr>
               <a:t>다른 데이터셋에서도 얼마나 개선될지 확실하지 않습니다</a:t>
             </a:r>
             <a:r>
-              <a:rPr lang="en-US" altLang="ko-KR" sz="1200">
+              <a:rPr lang="en-US" altLang="ko-KR" sz="1200" dirty="0">
                 <a:latin typeface="NanumBarunGothic" panose="020B0603020101020101" pitchFamily="34" charset="-127"/>
                 <a:ea typeface="NanumBarunGothic" panose="020B0603020101020101" pitchFamily="34" charset="-127"/>
               </a:rPr>
               <a:t>.</a:t>
             </a:r>
-            <a:endParaRPr lang="ko-KR" altLang="en-US" sz="1200">
+            <a:endParaRPr lang="ko-KR" altLang="en-US" sz="1200" dirty="0">
               <a:latin typeface="NanumBarunGothic" panose="020B0603020101020101" pitchFamily="34" charset="-127"/>
               <a:ea typeface="NanumBarunGothic" panose="020B0603020101020101" pitchFamily="34" charset="-127"/>
             </a:endParaRPr>

</xml_diff>

<commit_message>
Respond the reviewer's comment: - Table 5: Sejong data shows poor performance in other approaches and proposed with rerank shows the better performance (from Table 3 and 4). However, Table 5 does not show any huge improvement compared to other approaches. Did you try with other dataset? Not sure how much improvement it will show with others.
</commit_message>
<xml_diff>
--- a/contents/review.pptx
+++ b/contents/review.pptx
@@ -6852,10 +6852,23 @@
                 <a:latin typeface="NanumBarunGothic" panose="020B0603020101020101" pitchFamily="34" charset="-127"/>
                 <a:ea typeface="NanumBarunGothic" panose="020B0603020101020101" pitchFamily="34" charset="-127"/>
               </a:rPr>
-              <a:t>4. Table 5: Sejong data shows poor performance in other approaches and proposed with </a:t>
+              <a:t>4. </a:t>
+            </a:r>
+            <a:r>
+              <a:rPr lang="en-US" altLang="ko-KR" sz="1200" dirty="0">
+                <a:solidFill>
+                  <a:schemeClr val="accent6"/>
+                </a:solidFill>
+                <a:latin typeface="NanumBarunGothic" panose="020B0603020101020101" pitchFamily="34" charset="-127"/>
+                <a:ea typeface="NanumBarunGothic" panose="020B0603020101020101" pitchFamily="34" charset="-127"/>
+              </a:rPr>
+              <a:t>Table 5: Sejong data shows poor performance in other approaches and proposed with </a:t>
             </a:r>
             <a:r>
               <a:rPr lang="en-US" altLang="ko-KR" sz="1200" dirty="0" err="1">
+                <a:solidFill>
+                  <a:schemeClr val="accent6"/>
+                </a:solidFill>
                 <a:latin typeface="NanumBarunGothic" panose="020B0603020101020101" pitchFamily="34" charset="-127"/>
                 <a:ea typeface="NanumBarunGothic" panose="020B0603020101020101" pitchFamily="34" charset="-127"/>
               </a:rPr>
@@ -6863,6 +6876,9 @@
             </a:r>
             <a:r>
               <a:rPr lang="en-US" altLang="ko-KR" sz="1200" dirty="0">
+                <a:solidFill>
+                  <a:schemeClr val="accent6"/>
+                </a:solidFill>
                 <a:latin typeface="NanumBarunGothic" panose="020B0603020101020101" pitchFamily="34" charset="-127"/>
                 <a:ea typeface="NanumBarunGothic" panose="020B0603020101020101" pitchFamily="34" charset="-127"/>
               </a:rPr>
@@ -7409,6 +7425,9 @@
             </a:pPr>
             <a:r>
               <a:rPr lang="en-US" altLang="ko-KR" sz="1200" dirty="0">
+                <a:solidFill>
+                  <a:schemeClr val="accent6"/>
+                </a:solidFill>
                 <a:latin typeface="NanumBarunGothic" panose="020B0603020101020101" pitchFamily="34" charset="-127"/>
                 <a:ea typeface="NanumBarunGothic" panose="020B0603020101020101" pitchFamily="34" charset="-127"/>
               </a:rPr>
@@ -7416,6 +7435,9 @@
             </a:r>
             <a:r>
               <a:rPr lang="ko-KR" altLang="en-US" sz="1200" dirty="0">
+                <a:solidFill>
+                  <a:schemeClr val="accent6"/>
+                </a:solidFill>
                 <a:latin typeface="NanumBarunGothic" panose="020B0603020101020101" pitchFamily="34" charset="-127"/>
                 <a:ea typeface="NanumBarunGothic" panose="020B0603020101020101" pitchFamily="34" charset="-127"/>
               </a:rPr>
@@ -7423,6 +7445,9 @@
             </a:r>
             <a:r>
               <a:rPr lang="en-US" altLang="ko-KR" sz="1200" dirty="0">
+                <a:solidFill>
+                  <a:schemeClr val="accent6"/>
+                </a:solidFill>
                 <a:latin typeface="NanumBarunGothic" panose="020B0603020101020101" pitchFamily="34" charset="-127"/>
                 <a:ea typeface="NanumBarunGothic" panose="020B0603020101020101" pitchFamily="34" charset="-127"/>
               </a:rPr>
@@ -7430,6 +7455,9 @@
             </a:r>
             <a:r>
               <a:rPr lang="ko-KR" altLang="en-US" sz="1200" dirty="0">
+                <a:solidFill>
+                  <a:schemeClr val="accent6"/>
+                </a:solidFill>
                 <a:latin typeface="NanumBarunGothic" panose="020B0603020101020101" pitchFamily="34" charset="-127"/>
                 <a:ea typeface="NanumBarunGothic" panose="020B0603020101020101" pitchFamily="34" charset="-127"/>
               </a:rPr>
@@ -7437,6 +7465,9 @@
             </a:r>
             <a:r>
               <a:rPr lang="en-US" altLang="ko-KR" sz="1200" dirty="0">
+                <a:solidFill>
+                  <a:schemeClr val="accent6"/>
+                </a:solidFill>
                 <a:latin typeface="NanumBarunGothic" panose="020B0603020101020101" pitchFamily="34" charset="-127"/>
                 <a:ea typeface="NanumBarunGothic" panose="020B0603020101020101" pitchFamily="34" charset="-127"/>
               </a:rPr>
@@ -7444,6 +7475,9 @@
             </a:r>
             <a:r>
               <a:rPr lang="ko-KR" altLang="en-US" sz="1200" dirty="0">
+                <a:solidFill>
+                  <a:schemeClr val="accent6"/>
+                </a:solidFill>
                 <a:latin typeface="NanumBarunGothic" panose="020B0603020101020101" pitchFamily="34" charset="-127"/>
                 <a:ea typeface="NanumBarunGothic" panose="020B0603020101020101" pitchFamily="34" charset="-127"/>
               </a:rPr>
@@ -7451,6 +7485,9 @@
             </a:r>
             <a:r>
               <a:rPr lang="en-US" altLang="ko-KR" sz="1200" dirty="0">
+                <a:solidFill>
+                  <a:schemeClr val="accent6"/>
+                </a:solidFill>
                 <a:latin typeface="NanumBarunGothic" panose="020B0603020101020101" pitchFamily="34" charset="-127"/>
                 <a:ea typeface="NanumBarunGothic" panose="020B0603020101020101" pitchFamily="34" charset="-127"/>
               </a:rPr>
@@ -7458,6 +7495,9 @@
             </a:r>
             <a:r>
               <a:rPr lang="ko-KR" altLang="en-US" sz="1200" dirty="0">
+                <a:solidFill>
+                  <a:schemeClr val="accent6"/>
+                </a:solidFill>
                 <a:latin typeface="NanumBarunGothic" panose="020B0603020101020101" pitchFamily="34" charset="-127"/>
                 <a:ea typeface="NanumBarunGothic" panose="020B0603020101020101" pitchFamily="34" charset="-127"/>
               </a:rPr>
@@ -7465,6 +7505,9 @@
             </a:r>
             <a:r>
               <a:rPr lang="en-US" altLang="ko-KR" sz="1200" dirty="0">
+                <a:solidFill>
+                  <a:schemeClr val="accent6"/>
+                </a:solidFill>
                 <a:latin typeface="NanumBarunGothic" panose="020B0603020101020101" pitchFamily="34" charset="-127"/>
                 <a:ea typeface="NanumBarunGothic" panose="020B0603020101020101" pitchFamily="34" charset="-127"/>
               </a:rPr>
@@ -7472,6 +7515,9 @@
             </a:r>
             <a:r>
               <a:rPr lang="ko-KR" altLang="en-US" sz="1200" dirty="0">
+                <a:solidFill>
+                  <a:schemeClr val="accent6"/>
+                </a:solidFill>
                 <a:latin typeface="NanumBarunGothic" panose="020B0603020101020101" pitchFamily="34" charset="-127"/>
                 <a:ea typeface="NanumBarunGothic" panose="020B0603020101020101" pitchFamily="34" charset="-127"/>
               </a:rPr>
@@ -7479,6 +7525,9 @@
             </a:r>
             <a:r>
               <a:rPr lang="en-US" altLang="ko-KR" sz="1200" dirty="0">
+                <a:solidFill>
+                  <a:schemeClr val="accent6"/>
+                </a:solidFill>
                 <a:latin typeface="NanumBarunGothic" panose="020B0603020101020101" pitchFamily="34" charset="-127"/>
                 <a:ea typeface="NanumBarunGothic" panose="020B0603020101020101" pitchFamily="34" charset="-127"/>
               </a:rPr>
@@ -7486,6 +7535,9 @@
             </a:r>
             <a:r>
               <a:rPr lang="ko-KR" altLang="en-US" sz="1200" dirty="0">
+                <a:solidFill>
+                  <a:schemeClr val="accent6"/>
+                </a:solidFill>
                 <a:latin typeface="NanumBarunGothic" panose="020B0603020101020101" pitchFamily="34" charset="-127"/>
                 <a:ea typeface="NanumBarunGothic" panose="020B0603020101020101" pitchFamily="34" charset="-127"/>
               </a:rPr>
@@ -7493,6 +7545,9 @@
             </a:r>
             <a:r>
               <a:rPr lang="en-US" altLang="ko-KR" sz="1200" dirty="0">
+                <a:solidFill>
+                  <a:schemeClr val="accent6"/>
+                </a:solidFill>
                 <a:latin typeface="NanumBarunGothic" panose="020B0603020101020101" pitchFamily="34" charset="-127"/>
                 <a:ea typeface="NanumBarunGothic" panose="020B0603020101020101" pitchFamily="34" charset="-127"/>
               </a:rPr>
@@ -7500,6 +7555,9 @@
             </a:r>
             <a:r>
               <a:rPr lang="ko-KR" altLang="en-US" sz="1200" dirty="0">
+                <a:solidFill>
+                  <a:schemeClr val="accent6"/>
+                </a:solidFill>
                 <a:latin typeface="NanumBarunGothic" panose="020B0603020101020101" pitchFamily="34" charset="-127"/>
                 <a:ea typeface="NanumBarunGothic" panose="020B0603020101020101" pitchFamily="34" charset="-127"/>
               </a:rPr>
@@ -7507,6 +7565,9 @@
             </a:r>
             <a:r>
               <a:rPr lang="en-US" altLang="ko-KR" sz="1200" dirty="0">
+                <a:solidFill>
+                  <a:schemeClr val="accent6"/>
+                </a:solidFill>
                 <a:latin typeface="NanumBarunGothic" panose="020B0603020101020101" pitchFamily="34" charset="-127"/>
                 <a:ea typeface="NanumBarunGothic" panose="020B0603020101020101" pitchFamily="34" charset="-127"/>
               </a:rPr>
@@ -7514,6 +7575,9 @@
             </a:r>
             <a:r>
               <a:rPr lang="ko-KR" altLang="en-US" sz="1200" dirty="0">
+                <a:solidFill>
+                  <a:schemeClr val="accent6"/>
+                </a:solidFill>
                 <a:latin typeface="NanumBarunGothic" panose="020B0603020101020101" pitchFamily="34" charset="-127"/>
                 <a:ea typeface="NanumBarunGothic" panose="020B0603020101020101" pitchFamily="34" charset="-127"/>
               </a:rPr>
@@ -7521,6 +7585,9 @@
             </a:r>
             <a:r>
               <a:rPr lang="en-US" altLang="ko-KR" sz="1200" dirty="0">
+                <a:solidFill>
+                  <a:schemeClr val="accent6"/>
+                </a:solidFill>
                 <a:latin typeface="NanumBarunGothic" panose="020B0603020101020101" pitchFamily="34" charset="-127"/>
                 <a:ea typeface="NanumBarunGothic" panose="020B0603020101020101" pitchFamily="34" charset="-127"/>
               </a:rPr>
@@ -7528,6 +7595,9 @@
             </a:r>
             <a:r>
               <a:rPr lang="ko-KR" altLang="en-US" sz="1200" dirty="0">
+                <a:solidFill>
+                  <a:schemeClr val="accent6"/>
+                </a:solidFill>
                 <a:latin typeface="NanumBarunGothic" panose="020B0603020101020101" pitchFamily="34" charset="-127"/>
                 <a:ea typeface="NanumBarunGothic" panose="020B0603020101020101" pitchFamily="34" charset="-127"/>
               </a:rPr>
@@ -7535,6 +7605,9 @@
             </a:r>
             <a:r>
               <a:rPr lang="en-US" altLang="ko-KR" sz="1200" dirty="0">
+                <a:solidFill>
+                  <a:schemeClr val="accent6"/>
+                </a:solidFill>
                 <a:latin typeface="NanumBarunGothic" panose="020B0603020101020101" pitchFamily="34" charset="-127"/>
                 <a:ea typeface="NanumBarunGothic" panose="020B0603020101020101" pitchFamily="34" charset="-127"/>
               </a:rPr>
@@ -7542,6 +7615,9 @@
             </a:r>
             <a:r>
               <a:rPr lang="ko-KR" altLang="en-US" sz="1200" dirty="0">
+                <a:solidFill>
+                  <a:schemeClr val="accent6"/>
+                </a:solidFill>
                 <a:latin typeface="NanumBarunGothic" panose="020B0603020101020101" pitchFamily="34" charset="-127"/>
                 <a:ea typeface="NanumBarunGothic" panose="020B0603020101020101" pitchFamily="34" charset="-127"/>
               </a:rPr>
@@ -7549,12 +7625,18 @@
             </a:r>
             <a:r>
               <a:rPr lang="en-US" altLang="ko-KR" sz="1200" dirty="0">
+                <a:solidFill>
+                  <a:schemeClr val="accent6"/>
+                </a:solidFill>
                 <a:latin typeface="NanumBarunGothic" panose="020B0603020101020101" pitchFamily="34" charset="-127"/>
                 <a:ea typeface="NanumBarunGothic" panose="020B0603020101020101" pitchFamily="34" charset="-127"/>
               </a:rPr>
               <a:t>.</a:t>
             </a:r>
             <a:endParaRPr lang="ko-KR" altLang="en-US" sz="1200" dirty="0">
+              <a:solidFill>
+                <a:schemeClr val="accent6"/>
+              </a:solidFill>
               <a:latin typeface="NanumBarunGothic" panose="020B0603020101020101" pitchFamily="34" charset="-127"/>
               <a:ea typeface="NanumBarunGothic" panose="020B0603020101020101" pitchFamily="34" charset="-127"/>
             </a:endParaRPr>

</xml_diff>